<commit_message>
Added material to Session 8.
</commit_message>
<xml_diff>
--- a/slides/session07.pptx
+++ b/slides/session07.pptx
@@ -2197,7 +2197,7 @@
           <a:p>
             <a:pPr eaLnBrk="1" hangingPunct="1"/>
             <a:r>
-              <a:rPr lang="en-US" sz="3600" dirty="0" smtClean="0">
+              <a:rPr lang="en-US" sz="3600" smtClean="0">
                 <a:solidFill>
                   <a:schemeClr val="bg1"/>
                 </a:solidFill>
@@ -2214,17 +2214,27 @@
                 <a:latin typeface="Gill Sans"/>
                 <a:cs typeface="Gill Sans"/>
               </a:rPr>
-              <a:t>6</a:t>
-            </a:r>
-            <a:r>
-              <a:rPr lang="en-US" sz="3600" dirty="0" smtClean="0">
+              <a:t>7</a:t>
+            </a:r>
+            <a:r>
+              <a:rPr lang="en-US" sz="3600" smtClean="0">
                 <a:solidFill>
                   <a:schemeClr val="bg1"/>
                 </a:solidFill>
                 <a:latin typeface="Gill Sans"/>
                 <a:cs typeface="Gill Sans"/>
               </a:rPr>
-              <a:t>: PHP</a:t>
+              <a:t>: </a:t>
+            </a:r>
+            <a:r>
+              <a:rPr lang="en-US" sz="3600" dirty="0" smtClean="0">
+                <a:solidFill>
+                  <a:schemeClr val="bg1"/>
+                </a:solidFill>
+                <a:latin typeface="Gill Sans"/>
+                <a:cs typeface="Gill Sans"/>
+              </a:rPr>
+              <a:t>PHP</a:t>
             </a:r>
             <a:endParaRPr lang="en-US" sz="2400" b="0" dirty="0">
               <a:solidFill>
@@ -2314,11 +2324,7 @@
             </a:r>
             <a:r>
               <a:rPr lang="en-US" dirty="0" smtClean="0"/>
-              <a:t> </a:t>
-            </a:r>
-            <a:r>
-              <a:rPr lang="en-US" dirty="0" smtClean="0"/>
-              <a:t>Exercise</a:t>
+              <a:t> Exercise</a:t>
             </a:r>
             <a:endParaRPr lang="en-US" dirty="0"/>
           </a:p>
@@ -2341,13 +2347,8 @@
           <a:p>
             <a:r>
               <a:rPr lang="en-US" dirty="0" smtClean="0"/>
-              <a:t>Design a database to match drivers with passengers </a:t>
-            </a:r>
-            <a:r>
-              <a:rPr lang="en-US" dirty="0" smtClean="0"/>
-              <a:t>for ride sharing on long car trips:</a:t>
-            </a:r>
-            <a:endParaRPr lang="en-US" dirty="0" smtClean="0"/>
+              <a:t>Design a database to match drivers with passengers for ride sharing on long car trips:</a:t>
+            </a:r>
           </a:p>
           <a:p>
             <a:pPr lvl="1"/>
@@ -2360,23 +2361,14 @@
             <a:pPr lvl="1"/>
             <a:r>
               <a:rPr lang="en-US" dirty="0" smtClean="0"/>
-              <a:t>Passengers come looking for rides: they want to know about available rides </a:t>
-            </a:r>
+              <a:t>Passengers come looking for rides: they want to know about available rides and can make reservations</a:t>
+            </a:r>
+          </a:p>
+          <a:p>
+            <a:pPr lvl="1"/>
             <a:r>
               <a:rPr lang="en-US" dirty="0" smtClean="0"/>
-              <a:t>and can make reservations</a:t>
-            </a:r>
-            <a:endParaRPr lang="en-US" dirty="0" smtClean="0"/>
-          </a:p>
-          <a:p>
-            <a:pPr lvl="1"/>
-            <a:r>
-              <a:rPr lang="en-US" dirty="0" smtClean="0"/>
-              <a:t>These things happen in no particular </a:t>
-            </a:r>
-            <a:r>
-              <a:rPr lang="en-US" dirty="0" smtClean="0"/>
-              <a:t>order</a:t>
+              <a:t>These things happen in no particular order</a:t>
             </a:r>
           </a:p>
           <a:p>
@@ -2417,16 +2409,11 @@
               <a:rPr lang="en-US" dirty="0" smtClean="0"/>
               <a:t>ads </a:t>
             </a:r>
-            <a:endParaRPr lang="en-US" dirty="0" smtClean="0"/>
           </a:p>
           <a:p>
             <a:r>
               <a:rPr lang="en-US" dirty="0" smtClean="0"/>
-              <a:t>Build a </a:t>
-            </a:r>
-            <a:r>
-              <a:rPr lang="en-US" dirty="0" smtClean="0"/>
-              <a:t>web application to accomplish the above</a:t>
+              <a:t>Build a web application to accomplish the above</a:t>
             </a:r>
             <a:endParaRPr lang="en-US" dirty="0"/>
           </a:p>
@@ -2491,11 +2478,7 @@
             </a:r>
             <a:r>
               <a:rPr lang="en-US" dirty="0" smtClean="0"/>
-              <a:t> Exercise: </a:t>
-            </a:r>
-            <a:r>
-              <a:rPr lang="en-US" dirty="0" smtClean="0"/>
-              <a:t>Tasks</a:t>
+              <a:t> Exercise: Tasks</a:t>
             </a:r>
             <a:endParaRPr lang="en-US" dirty="0"/>
           </a:p>
@@ -2552,15 +2535,7 @@
             <a:pPr lvl="1"/>
             <a:r>
               <a:rPr lang="en-US" dirty="0" smtClean="0"/>
-              <a:t>What happens when a driver comes to find out who </a:t>
-            </a:r>
-            <a:r>
-              <a:rPr lang="en-US" dirty="0" smtClean="0"/>
-              <a:t>the </a:t>
-            </a:r>
-            <a:r>
-              <a:rPr lang="en-US" dirty="0" smtClean="0"/>
-              <a:t>passengers are?</a:t>
+              <a:t>What happens when a driver comes to find out who the passengers are?</a:t>
             </a:r>
           </a:p>
           <a:p>
@@ -3666,15 +3641,7 @@
           <a:p>
             <a:r>
               <a:rPr lang="en-US" dirty="0" smtClean="0"/>
-              <a:t>Web pages are dynamically constructed </a:t>
-            </a:r>
-            <a:r>
-              <a:rPr lang="en-US" dirty="0" smtClean="0"/>
-              <a:t>from </a:t>
-            </a:r>
-            <a:r>
-              <a:rPr lang="en-US" dirty="0" smtClean="0"/>
-              <a:t>results of database queries</a:t>
+              <a:t>Web pages are dynamically constructed from results of database queries</a:t>
             </a:r>
           </a:p>
         </p:txBody>
@@ -7109,15 +7076,7 @@
           <a:p>
             <a:r>
               <a:rPr lang="en-US" dirty="0" smtClean="0"/>
-              <a:t>PHP is a </a:t>
-            </a:r>
-            <a:r>
-              <a:rPr lang="en-US" dirty="0" smtClean="0"/>
-              <a:t>server-side </a:t>
-            </a:r>
-            <a:r>
-              <a:rPr lang="en-US" dirty="0" smtClean="0"/>
-              <a:t>scripting language</a:t>
+              <a:t>PHP is a server-side scripting language</a:t>
             </a:r>
           </a:p>
           <a:p>
@@ -7143,21 +7102,8 @@
             <a:pPr lvl="1"/>
             <a:r>
               <a:rPr lang="en-US" dirty="0" smtClean="0"/>
-              <a:t>More specifically, r</a:t>
-            </a:r>
-            <a:r>
-              <a:rPr lang="en-US" dirty="0" smtClean="0"/>
-              <a:t>uns </a:t>
-            </a:r>
-            <a:r>
-              <a:rPr lang="en-US" dirty="0" smtClean="0"/>
-              <a:t>inside the web </a:t>
-            </a:r>
-            <a:r>
-              <a:rPr lang="en-US" dirty="0" smtClean="0"/>
-              <a:t>server</a:t>
-            </a:r>
-            <a:endParaRPr lang="en-US" dirty="0" smtClean="0"/>
+              <a:t>More specifically, runs inside the web server</a:t>
+            </a:r>
           </a:p>
           <a:p>
             <a:r>
@@ -7280,11 +7226,7 @@
           <a:p>
             <a:r>
               <a:rPr lang="en-US" dirty="0" smtClean="0"/>
-              <a:t>Are </a:t>
-            </a:r>
-            <a:r>
-              <a:rPr lang="en-US" dirty="0" smtClean="0"/>
-              <a:t>just like normal HTML pages</a:t>
+              <a:t>Are just like normal HTML pages</a:t>
             </a:r>
           </a:p>
           <a:p>

</xml_diff>